<commit_message>
readinput is nu readtext :)
</commit_message>
<xml_diff>
--- a/verslagen/presentatie.pptx
+++ b/verslagen/presentatie.pptx
@@ -107,6 +107,11 @@
       </a:defRPr>
     </a:lvl9pPr>
   </p:defaultTextStyle>
+  <p:extLst>
+    <p:ext uri="{EFAFB233-063F-42B5-8137-9DF3F51BA10A}">
+      <p15:sldGuideLst xmlns:p15="http://schemas.microsoft.com/office/powerpoint/2012/main"/>
+    </p:ext>
+  </p:extLst>
 </p:presentation>
 </file>
 
@@ -167,7 +172,7 @@
           <a:noFill/>
           <a:extLst>
             <a:ext uri="{909E8E84-426E-40dd-AFC4-6F175D3DCCD1}">
-              <a14:hiddenFill xmlns:a14="http://schemas.microsoft.com/office/drawing/2010/main" xmlns="">
+              <a14:hiddenFill xmlns="" xmlns:a14="http://schemas.microsoft.com/office/drawing/2010/main">
                 <a:solidFill>
                   <a:srgbClr val="FFFFFF"/>
                 </a:solidFill>
@@ -226,7 +231,7 @@
             </a:ln>
             <a:extLst>
               <a:ext uri="{91240B29-F687-4f45-9708-019B960494DF}">
-                <a14:hiddenLine xmlns:a14="http://schemas.microsoft.com/office/drawing/2010/main" xmlns="" w="9525">
+                <a14:hiddenLine xmlns="" xmlns:a14="http://schemas.microsoft.com/office/drawing/2010/main" w="9525">
                   <a:solidFill>
                     <a:srgbClr val="000000"/>
                   </a:solidFill>
@@ -316,7 +321,7 @@
             </a:ln>
             <a:extLst>
               <a:ext uri="{91240B29-F687-4f45-9708-019B960494DF}">
-                <a14:hiddenLine xmlns:a14="http://schemas.microsoft.com/office/drawing/2010/main" xmlns="" w="9525">
+                <a14:hiddenLine xmlns="" xmlns:a14="http://schemas.microsoft.com/office/drawing/2010/main" w="9525">
                   <a:solidFill>
                     <a:srgbClr val="000000"/>
                   </a:solidFill>
@@ -406,7 +411,7 @@
             </a:ln>
             <a:extLst>
               <a:ext uri="{91240B29-F687-4f45-9708-019B960494DF}">
-                <a14:hiddenLine xmlns:a14="http://schemas.microsoft.com/office/drawing/2010/main" xmlns="" w="9525">
+                <a14:hiddenLine xmlns="" xmlns:a14="http://schemas.microsoft.com/office/drawing/2010/main" w="9525">
                   <a:solidFill>
                     <a:srgbClr val="000000"/>
                   </a:solidFill>
@@ -440,7 +445,7 @@
             </a:ln>
             <a:extLst>
               <a:ext uri="{91240B29-F687-4f45-9708-019B960494DF}">
-                <a14:hiddenLine xmlns:a14="http://schemas.microsoft.com/office/drawing/2010/main" xmlns="" w="9525">
+                <a14:hiddenLine xmlns="" xmlns:a14="http://schemas.microsoft.com/office/drawing/2010/main" w="9525">
                   <a:solidFill>
                     <a:srgbClr val="000000"/>
                   </a:solidFill>
@@ -530,7 +535,7 @@
             </a:ln>
             <a:extLst>
               <a:ext uri="{91240B29-F687-4f45-9708-019B960494DF}">
-                <a14:hiddenLine xmlns:a14="http://schemas.microsoft.com/office/drawing/2010/main" xmlns="" w="9525">
+                <a14:hiddenLine xmlns="" xmlns:a14="http://schemas.microsoft.com/office/drawing/2010/main" w="9525">
                   <a:solidFill>
                     <a:srgbClr val="000000"/>
                   </a:solidFill>
@@ -592,7 +597,7 @@
             </a:ln>
             <a:extLst>
               <a:ext uri="{91240B29-F687-4f45-9708-019B960494DF}">
-                <a14:hiddenLine xmlns:a14="http://schemas.microsoft.com/office/drawing/2010/main" xmlns="" w="9525">
+                <a14:hiddenLine xmlns="" xmlns:a14="http://schemas.microsoft.com/office/drawing/2010/main" w="9525">
                   <a:solidFill>
                     <a:srgbClr val="000000"/>
                   </a:solidFill>
@@ -654,7 +659,7 @@
             </a:ln>
             <a:extLst>
               <a:ext uri="{91240B29-F687-4f45-9708-019B960494DF}">
-                <a14:hiddenLine xmlns:a14="http://schemas.microsoft.com/office/drawing/2010/main" xmlns="" w="9525">
+                <a14:hiddenLine xmlns="" xmlns:a14="http://schemas.microsoft.com/office/drawing/2010/main" w="9525">
                   <a:solidFill>
                     <a:srgbClr val="000000"/>
                   </a:solidFill>
@@ -744,7 +749,7 @@
             </a:ln>
             <a:extLst>
               <a:ext uri="{91240B29-F687-4f45-9708-019B960494DF}">
-                <a14:hiddenLine xmlns:a14="http://schemas.microsoft.com/office/drawing/2010/main" xmlns="" w="9525">
+                <a14:hiddenLine xmlns="" xmlns:a14="http://schemas.microsoft.com/office/drawing/2010/main" w="9525">
                   <a:solidFill>
                     <a:srgbClr val="000000"/>
                   </a:solidFill>
@@ -806,7 +811,7 @@
             </a:ln>
             <a:extLst>
               <a:ext uri="{91240B29-F687-4f45-9708-019B960494DF}">
-                <a14:hiddenLine xmlns:a14="http://schemas.microsoft.com/office/drawing/2010/main" xmlns="" w="9525">
+                <a14:hiddenLine xmlns="" xmlns:a14="http://schemas.microsoft.com/office/drawing/2010/main" w="9525">
                   <a:solidFill>
                     <a:srgbClr val="000000"/>
                   </a:solidFill>
@@ -868,7 +873,7 @@
             </a:ln>
             <a:extLst>
               <a:ext uri="{91240B29-F687-4f45-9708-019B960494DF}">
-                <a14:hiddenLine xmlns:a14="http://schemas.microsoft.com/office/drawing/2010/main" xmlns="" w="9525">
+                <a14:hiddenLine xmlns="" xmlns:a14="http://schemas.microsoft.com/office/drawing/2010/main" w="9525">
                   <a:solidFill>
                     <a:srgbClr val="000000"/>
                   </a:solidFill>
@@ -958,7 +963,7 @@
             </a:ln>
             <a:extLst>
               <a:ext uri="{91240B29-F687-4f45-9708-019B960494DF}">
-                <a14:hiddenLine xmlns:a14="http://schemas.microsoft.com/office/drawing/2010/main" xmlns="" w="9525">
+                <a14:hiddenLine xmlns="" xmlns:a14="http://schemas.microsoft.com/office/drawing/2010/main" w="9525">
                   <a:solidFill>
                     <a:srgbClr val="000000"/>
                   </a:solidFill>
@@ -1048,7 +1053,7 @@
             </a:ln>
             <a:extLst>
               <a:ext uri="{91240B29-F687-4f45-9708-019B960494DF}">
-                <a14:hiddenLine xmlns:a14="http://schemas.microsoft.com/office/drawing/2010/main" xmlns="" w="9525">
+                <a14:hiddenLine xmlns="" xmlns:a14="http://schemas.microsoft.com/office/drawing/2010/main" w="9525">
                   <a:solidFill>
                     <a:srgbClr val="000000"/>
                   </a:solidFill>
@@ -1110,7 +1115,7 @@
             </a:ln>
             <a:extLst>
               <a:ext uri="{91240B29-F687-4f45-9708-019B960494DF}">
-                <a14:hiddenLine xmlns:a14="http://schemas.microsoft.com/office/drawing/2010/main" xmlns="" w="9525">
+                <a14:hiddenLine xmlns="" xmlns:a14="http://schemas.microsoft.com/office/drawing/2010/main" w="9525">
                   <a:solidFill>
                     <a:srgbClr val="000000"/>
                   </a:solidFill>
@@ -1220,7 +1225,7 @@
             </a:ln>
             <a:extLst>
               <a:ext uri="{91240B29-F687-4f45-9708-019B960494DF}">
-                <a14:hiddenLine xmlns:a14="http://schemas.microsoft.com/office/drawing/2010/main" xmlns="" w="9525">
+                <a14:hiddenLine xmlns="" xmlns:a14="http://schemas.microsoft.com/office/drawing/2010/main" w="9525">
                   <a:solidFill>
                     <a:srgbClr val="000000"/>
                   </a:solidFill>
@@ -1282,7 +1287,7 @@
             </a:ln>
             <a:extLst>
               <a:ext uri="{91240B29-F687-4f45-9708-019B960494DF}">
-                <a14:hiddenLine xmlns:a14="http://schemas.microsoft.com/office/drawing/2010/main" xmlns="" w="9525">
+                <a14:hiddenLine xmlns="" xmlns:a14="http://schemas.microsoft.com/office/drawing/2010/main" w="9525">
                   <a:solidFill>
                     <a:srgbClr val="000000"/>
                   </a:solidFill>
@@ -1372,7 +1377,7 @@
             </a:ln>
             <a:extLst>
               <a:ext uri="{91240B29-F687-4f45-9708-019B960494DF}">
-                <a14:hiddenLine xmlns:a14="http://schemas.microsoft.com/office/drawing/2010/main" xmlns="" w="9525">
+                <a14:hiddenLine xmlns="" xmlns:a14="http://schemas.microsoft.com/office/drawing/2010/main" w="9525">
                   <a:solidFill>
                     <a:srgbClr val="000000"/>
                   </a:solidFill>
@@ -1462,7 +1467,7 @@
             </a:ln>
             <a:extLst>
               <a:ext uri="{91240B29-F687-4f45-9708-019B960494DF}">
-                <a14:hiddenLine xmlns:a14="http://schemas.microsoft.com/office/drawing/2010/main" xmlns="" w="9525">
+                <a14:hiddenLine xmlns="" xmlns:a14="http://schemas.microsoft.com/office/drawing/2010/main" w="9525">
                   <a:solidFill>
                     <a:srgbClr val="000000"/>
                   </a:solidFill>
@@ -1524,7 +1529,7 @@
             </a:ln>
             <a:extLst>
               <a:ext uri="{91240B29-F687-4f45-9708-019B960494DF}">
-                <a14:hiddenLine xmlns:a14="http://schemas.microsoft.com/office/drawing/2010/main" xmlns="" w="9525">
+                <a14:hiddenLine xmlns="" xmlns:a14="http://schemas.microsoft.com/office/drawing/2010/main" w="9525">
                   <a:solidFill>
                     <a:srgbClr val="000000"/>
                   </a:solidFill>
@@ -1614,7 +1619,7 @@
             </a:ln>
             <a:extLst>
               <a:ext uri="{91240B29-F687-4f45-9708-019B960494DF}">
-                <a14:hiddenLine xmlns:a14="http://schemas.microsoft.com/office/drawing/2010/main" xmlns="" w="9525">
+                <a14:hiddenLine xmlns="" xmlns:a14="http://schemas.microsoft.com/office/drawing/2010/main" w="9525">
                   <a:solidFill>
                     <a:srgbClr val="000000"/>
                   </a:solidFill>
@@ -1704,7 +1709,7 @@
             </a:ln>
             <a:extLst>
               <a:ext uri="{91240B29-F687-4f45-9708-019B960494DF}">
-                <a14:hiddenLine xmlns:a14="http://schemas.microsoft.com/office/drawing/2010/main" xmlns="" w="9525">
+                <a14:hiddenLine xmlns="" xmlns:a14="http://schemas.microsoft.com/office/drawing/2010/main" w="9525">
                   <a:solidFill>
                     <a:srgbClr val="000000"/>
                   </a:solidFill>
@@ -1760,7 +1765,7 @@
             </a:ln>
             <a:extLst>
               <a:ext uri="{91240B29-F687-4f45-9708-019B960494DF}">
-                <a14:hiddenLine xmlns:a14="http://schemas.microsoft.com/office/drawing/2010/main" xmlns="" w="9525">
+                <a14:hiddenLine xmlns="" xmlns:a14="http://schemas.microsoft.com/office/drawing/2010/main" w="9525">
                   <a:solidFill>
                     <a:srgbClr val="000000"/>
                   </a:solidFill>
@@ -1850,7 +1855,7 @@
             </a:ln>
             <a:extLst>
               <a:ext uri="{91240B29-F687-4f45-9708-019B960494DF}">
-                <a14:hiddenLine xmlns:a14="http://schemas.microsoft.com/office/drawing/2010/main" xmlns="" w="9525">
+                <a14:hiddenLine xmlns="" xmlns:a14="http://schemas.microsoft.com/office/drawing/2010/main" w="9525">
                   <a:solidFill>
                     <a:srgbClr val="000000"/>
                   </a:solidFill>
@@ -1906,7 +1911,7 @@
             </a:ln>
             <a:extLst>
               <a:ext uri="{91240B29-F687-4f45-9708-019B960494DF}">
-                <a14:hiddenLine xmlns:a14="http://schemas.microsoft.com/office/drawing/2010/main" xmlns="" w="9525">
+                <a14:hiddenLine xmlns="" xmlns:a14="http://schemas.microsoft.com/office/drawing/2010/main" w="9525">
                   <a:solidFill>
                     <a:srgbClr val="000000"/>
                   </a:solidFill>
@@ -1996,7 +2001,7 @@
             </a:ln>
             <a:extLst>
               <a:ext uri="{91240B29-F687-4f45-9708-019B960494DF}">
-                <a14:hiddenLine xmlns:a14="http://schemas.microsoft.com/office/drawing/2010/main" xmlns="" w="9525">
+                <a14:hiddenLine xmlns="" xmlns:a14="http://schemas.microsoft.com/office/drawing/2010/main" w="9525">
                   <a:solidFill>
                     <a:srgbClr val="000000"/>
                   </a:solidFill>
@@ -2064,7 +2069,7 @@
             </a:ln>
             <a:extLst>
               <a:ext uri="{91240B29-F687-4f45-9708-019B960494DF}">
-                <a14:hiddenLine xmlns:a14="http://schemas.microsoft.com/office/drawing/2010/main" xmlns="" w="9525">
+                <a14:hiddenLine xmlns="" xmlns:a14="http://schemas.microsoft.com/office/drawing/2010/main" w="9525">
                   <a:solidFill>
                     <a:srgbClr val="000000"/>
                   </a:solidFill>
@@ -2154,7 +2159,7 @@
             </a:ln>
             <a:extLst>
               <a:ext uri="{91240B29-F687-4f45-9708-019B960494DF}">
-                <a14:hiddenLine xmlns:a14="http://schemas.microsoft.com/office/drawing/2010/main" xmlns="" w="9525">
+                <a14:hiddenLine xmlns="" xmlns:a14="http://schemas.microsoft.com/office/drawing/2010/main" w="9525">
                   <a:solidFill>
                     <a:srgbClr val="000000"/>
                   </a:solidFill>
@@ -2222,7 +2227,7 @@
             </a:ln>
             <a:extLst>
               <a:ext uri="{91240B29-F687-4f45-9708-019B960494DF}">
-                <a14:hiddenLine xmlns:a14="http://schemas.microsoft.com/office/drawing/2010/main" xmlns="" w="9525">
+                <a14:hiddenLine xmlns="" xmlns:a14="http://schemas.microsoft.com/office/drawing/2010/main" w="9525">
                   <a:solidFill>
                     <a:srgbClr val="000000"/>
                   </a:solidFill>
@@ -2312,7 +2317,7 @@
             </a:ln>
             <a:extLst>
               <a:ext uri="{91240B29-F687-4f45-9708-019B960494DF}">
-                <a14:hiddenLine xmlns:a14="http://schemas.microsoft.com/office/drawing/2010/main" xmlns="" w="9525">
+                <a14:hiddenLine xmlns="" xmlns:a14="http://schemas.microsoft.com/office/drawing/2010/main" w="9525">
                   <a:solidFill>
                     <a:srgbClr val="000000"/>
                   </a:solidFill>
@@ -2346,7 +2351,7 @@
             </a:ln>
             <a:extLst>
               <a:ext uri="{91240B29-F687-4f45-9708-019B960494DF}">
-                <a14:hiddenLine xmlns:a14="http://schemas.microsoft.com/office/drawing/2010/main" xmlns="" w="9525">
+                <a14:hiddenLine xmlns="" xmlns:a14="http://schemas.microsoft.com/office/drawing/2010/main" w="9525">
                   <a:solidFill>
                     <a:srgbClr val="000000"/>
                   </a:solidFill>
@@ -2436,7 +2441,7 @@
             </a:ln>
             <a:extLst>
               <a:ext uri="{91240B29-F687-4f45-9708-019B960494DF}">
-                <a14:hiddenLine xmlns:a14="http://schemas.microsoft.com/office/drawing/2010/main" xmlns="" w="9525">
+                <a14:hiddenLine xmlns="" xmlns:a14="http://schemas.microsoft.com/office/drawing/2010/main" w="9525">
                   <a:solidFill>
                     <a:srgbClr val="000000"/>
                   </a:solidFill>
@@ -2498,7 +2503,7 @@
             </a:ln>
             <a:extLst>
               <a:ext uri="{91240B29-F687-4f45-9708-019B960494DF}">
-                <a14:hiddenLine xmlns:a14="http://schemas.microsoft.com/office/drawing/2010/main" xmlns="" w="9525">
+                <a14:hiddenLine xmlns="" xmlns:a14="http://schemas.microsoft.com/office/drawing/2010/main" w="9525">
                   <a:solidFill>
                     <a:srgbClr val="000000"/>
                   </a:solidFill>
@@ -2560,7 +2565,7 @@
             </a:ln>
             <a:extLst>
               <a:ext uri="{91240B29-F687-4f45-9708-019B960494DF}">
-                <a14:hiddenLine xmlns:a14="http://schemas.microsoft.com/office/drawing/2010/main" xmlns="" w="9525">
+                <a14:hiddenLine xmlns="" xmlns:a14="http://schemas.microsoft.com/office/drawing/2010/main" w="9525">
                   <a:solidFill>
                     <a:srgbClr val="000000"/>
                   </a:solidFill>
@@ -2650,7 +2655,7 @@
             </a:ln>
             <a:extLst>
               <a:ext uri="{91240B29-F687-4f45-9708-019B960494DF}">
-                <a14:hiddenLine xmlns:a14="http://schemas.microsoft.com/office/drawing/2010/main" xmlns="" w="9525">
+                <a14:hiddenLine xmlns="" xmlns:a14="http://schemas.microsoft.com/office/drawing/2010/main" w="9525">
                   <a:solidFill>
                     <a:srgbClr val="000000"/>
                   </a:solidFill>
@@ -2718,7 +2723,7 @@
             </a:ln>
             <a:extLst>
               <a:ext uri="{91240B29-F687-4f45-9708-019B960494DF}">
-                <a14:hiddenLine xmlns:a14="http://schemas.microsoft.com/office/drawing/2010/main" xmlns="" w="9525">
+                <a14:hiddenLine xmlns="" xmlns:a14="http://schemas.microsoft.com/office/drawing/2010/main" w="9525">
                   <a:solidFill>
                     <a:srgbClr val="000000"/>
                   </a:solidFill>
@@ -2780,7 +2785,7 @@
             </a:ln>
             <a:extLst>
               <a:ext uri="{91240B29-F687-4f45-9708-019B960494DF}">
-                <a14:hiddenLine xmlns:a14="http://schemas.microsoft.com/office/drawing/2010/main" xmlns="" w="9525">
+                <a14:hiddenLine xmlns="" xmlns:a14="http://schemas.microsoft.com/office/drawing/2010/main" w="9525">
                   <a:solidFill>
                     <a:srgbClr val="000000"/>
                   </a:solidFill>
@@ -2870,7 +2875,7 @@
             </a:ln>
             <a:extLst>
               <a:ext uri="{91240B29-F687-4f45-9708-019B960494DF}">
-                <a14:hiddenLine xmlns:a14="http://schemas.microsoft.com/office/drawing/2010/main" xmlns="" w="9525">
+                <a14:hiddenLine xmlns="" xmlns:a14="http://schemas.microsoft.com/office/drawing/2010/main" w="9525">
                   <a:solidFill>
                     <a:srgbClr val="000000"/>
                   </a:solidFill>
@@ -2932,7 +2937,7 @@
             </a:ln>
             <a:extLst>
               <a:ext uri="{91240B29-F687-4f45-9708-019B960494DF}">
-                <a14:hiddenLine xmlns:a14="http://schemas.microsoft.com/office/drawing/2010/main" xmlns="" w="9525">
+                <a14:hiddenLine xmlns="" xmlns:a14="http://schemas.microsoft.com/office/drawing/2010/main" w="9525">
                   <a:solidFill>
                     <a:srgbClr val="000000"/>
                   </a:solidFill>
@@ -3022,7 +3027,7 @@
             </a:ln>
             <a:extLst>
               <a:ext uri="{91240B29-F687-4f45-9708-019B960494DF}">
-                <a14:hiddenLine xmlns:a14="http://schemas.microsoft.com/office/drawing/2010/main" xmlns="" w="9525">
+                <a14:hiddenLine xmlns="" xmlns:a14="http://schemas.microsoft.com/office/drawing/2010/main" w="9525">
                   <a:solidFill>
                     <a:srgbClr val="000000"/>
                   </a:solidFill>
@@ -3084,7 +3089,7 @@
             </a:ln>
             <a:extLst>
               <a:ext uri="{91240B29-F687-4f45-9708-019B960494DF}">
-                <a14:hiddenLine xmlns:a14="http://schemas.microsoft.com/office/drawing/2010/main" xmlns="" w="9525">
+                <a14:hiddenLine xmlns="" xmlns:a14="http://schemas.microsoft.com/office/drawing/2010/main" w="9525">
                   <a:solidFill>
                     <a:srgbClr val="000000"/>
                   </a:solidFill>
@@ -3174,7 +3179,7 @@
             </a:ln>
             <a:extLst>
               <a:ext uri="{91240B29-F687-4f45-9708-019B960494DF}">
-                <a14:hiddenLine xmlns:a14="http://schemas.microsoft.com/office/drawing/2010/main" xmlns="" w="9525">
+                <a14:hiddenLine xmlns="" xmlns:a14="http://schemas.microsoft.com/office/drawing/2010/main" w="9525">
                   <a:solidFill>
                     <a:srgbClr val="000000"/>
                   </a:solidFill>
@@ -3208,7 +3213,7 @@
             </a:ln>
             <a:extLst>
               <a:ext uri="{91240B29-F687-4f45-9708-019B960494DF}">
-                <a14:hiddenLine xmlns:a14="http://schemas.microsoft.com/office/drawing/2010/main" xmlns="" w="9525">
+                <a14:hiddenLine xmlns="" xmlns:a14="http://schemas.microsoft.com/office/drawing/2010/main" w="9525">
                   <a:solidFill>
                     <a:srgbClr val="000000"/>
                   </a:solidFill>
@@ -3273,7 +3278,7 @@
             </a:ln>
             <a:extLst>
               <a:ext uri="{91240B29-F687-4f45-9708-019B960494DF}">
-                <a14:hiddenLine xmlns:a14="http://schemas.microsoft.com/office/drawing/2010/main" xmlns="" w="9525">
+                <a14:hiddenLine xmlns="" xmlns:a14="http://schemas.microsoft.com/office/drawing/2010/main" w="9525">
                   <a:solidFill>
                     <a:srgbClr val="000000"/>
                   </a:solidFill>
@@ -3363,7 +3368,7 @@
             </a:ln>
             <a:extLst>
               <a:ext uri="{91240B29-F687-4f45-9708-019B960494DF}">
-                <a14:hiddenLine xmlns:a14="http://schemas.microsoft.com/office/drawing/2010/main" xmlns="" w="9525">
+                <a14:hiddenLine xmlns="" xmlns:a14="http://schemas.microsoft.com/office/drawing/2010/main" w="9525">
                   <a:solidFill>
                     <a:srgbClr val="000000"/>
                   </a:solidFill>
@@ -3425,7 +3430,7 @@
             </a:ln>
             <a:extLst>
               <a:ext uri="{91240B29-F687-4f45-9708-019B960494DF}">
-                <a14:hiddenLine xmlns:a14="http://schemas.microsoft.com/office/drawing/2010/main" xmlns="" w="9525">
+                <a14:hiddenLine xmlns="" xmlns:a14="http://schemas.microsoft.com/office/drawing/2010/main" w="9525">
                   <a:solidFill>
                     <a:srgbClr val="000000"/>
                   </a:solidFill>
@@ -3515,7 +3520,7 @@
             </a:ln>
             <a:extLst>
               <a:ext uri="{91240B29-F687-4f45-9708-019B960494DF}">
-                <a14:hiddenLine xmlns:a14="http://schemas.microsoft.com/office/drawing/2010/main" xmlns="" w="9525">
+                <a14:hiddenLine xmlns="" xmlns:a14="http://schemas.microsoft.com/office/drawing/2010/main" w="9525">
                   <a:solidFill>
                     <a:srgbClr val="000000"/>
                   </a:solidFill>
@@ -3605,7 +3610,7 @@
             </a:ln>
             <a:extLst>
               <a:ext uri="{91240B29-F687-4f45-9708-019B960494DF}">
-                <a14:hiddenLine xmlns:a14="http://schemas.microsoft.com/office/drawing/2010/main" xmlns="" w="9525">
+                <a14:hiddenLine xmlns="" xmlns:a14="http://schemas.microsoft.com/office/drawing/2010/main" w="9525">
                   <a:solidFill>
                     <a:srgbClr val="000000"/>
                   </a:solidFill>
@@ -3670,7 +3675,7 @@
             </a:ln>
             <a:extLst>
               <a:ext uri="{91240B29-F687-4f45-9708-019B960494DF}">
-                <a14:hiddenLine xmlns:a14="http://schemas.microsoft.com/office/drawing/2010/main" xmlns="" w="9525">
+                <a14:hiddenLine xmlns="" xmlns:a14="http://schemas.microsoft.com/office/drawing/2010/main" w="9525">
                   <a:solidFill>
                     <a:srgbClr val="000000"/>
                   </a:solidFill>
@@ -3732,7 +3737,7 @@
             </a:ln>
             <a:extLst>
               <a:ext uri="{91240B29-F687-4f45-9708-019B960494DF}">
-                <a14:hiddenLine xmlns:a14="http://schemas.microsoft.com/office/drawing/2010/main" xmlns="" w="9525">
+                <a14:hiddenLine xmlns="" xmlns:a14="http://schemas.microsoft.com/office/drawing/2010/main" w="9525">
                   <a:solidFill>
                     <a:srgbClr val="000000"/>
                   </a:solidFill>
@@ -3822,7 +3827,7 @@
             </a:ln>
             <a:extLst>
               <a:ext uri="{91240B29-F687-4f45-9708-019B960494DF}">
-                <a14:hiddenLine xmlns:a14="http://schemas.microsoft.com/office/drawing/2010/main" xmlns="" w="9525">
+                <a14:hiddenLine xmlns="" xmlns:a14="http://schemas.microsoft.com/office/drawing/2010/main" w="9525">
                   <a:solidFill>
                     <a:srgbClr val="000000"/>
                   </a:solidFill>
@@ -3912,7 +3917,7 @@
             </a:ln>
             <a:extLst>
               <a:ext uri="{91240B29-F687-4f45-9708-019B960494DF}">
-                <a14:hiddenLine xmlns:a14="http://schemas.microsoft.com/office/drawing/2010/main" xmlns="" w="9525">
+                <a14:hiddenLine xmlns="" xmlns:a14="http://schemas.microsoft.com/office/drawing/2010/main" w="9525">
                   <a:solidFill>
                     <a:srgbClr val="000000"/>
                   </a:solidFill>
@@ -3974,7 +3979,7 @@
             </a:ln>
             <a:extLst>
               <a:ext uri="{91240B29-F687-4f45-9708-019B960494DF}">
-                <a14:hiddenLine xmlns:a14="http://schemas.microsoft.com/office/drawing/2010/main" xmlns="" w="9525">
+                <a14:hiddenLine xmlns="" xmlns:a14="http://schemas.microsoft.com/office/drawing/2010/main" w="9525">
                   <a:solidFill>
                     <a:srgbClr val="000000"/>
                   </a:solidFill>
@@ -4094,7 +4099,7 @@
             </a:ln>
             <a:extLst>
               <a:ext uri="{91240B29-F687-4f45-9708-019B960494DF}">
-                <a14:hiddenLine xmlns:a14="http://schemas.microsoft.com/office/drawing/2010/main" xmlns="" w="9525">
+                <a14:hiddenLine xmlns="" xmlns:a14="http://schemas.microsoft.com/office/drawing/2010/main" w="9525">
                   <a:solidFill>
                     <a:srgbClr val="000000"/>
                   </a:solidFill>
@@ -4162,7 +4167,7 @@
             </a:ln>
             <a:extLst>
               <a:ext uri="{91240B29-F687-4f45-9708-019B960494DF}">
-                <a14:hiddenLine xmlns:a14="http://schemas.microsoft.com/office/drawing/2010/main" xmlns="" w="9525">
+                <a14:hiddenLine xmlns="" xmlns:a14="http://schemas.microsoft.com/office/drawing/2010/main" w="9525">
                   <a:solidFill>
                     <a:srgbClr val="000000"/>
                   </a:solidFill>
@@ -4252,7 +4257,7 @@
             </a:ln>
             <a:extLst>
               <a:ext uri="{91240B29-F687-4f45-9708-019B960494DF}">
-                <a14:hiddenLine xmlns:a14="http://schemas.microsoft.com/office/drawing/2010/main" xmlns="" w="9525">
+                <a14:hiddenLine xmlns="" xmlns:a14="http://schemas.microsoft.com/office/drawing/2010/main" w="9525">
                   <a:solidFill>
                     <a:srgbClr val="000000"/>
                   </a:solidFill>
@@ -4392,7 +4397,7 @@
           <a:p>
             <a:fld id="{48A87A34-81AB-432B-8DAE-1953F412C126}" type="datetimeFigureOut">
               <a:rPr lang="en-US" dirty="0"/>
-              <a:t>11/4/2015</a:t>
+              <a:t>11/5/2015</a:t>
             </a:fld>
             <a:endParaRPr lang="en-US" dirty="0"/>
           </a:p>
@@ -4654,7 +4659,7 @@
           <a:p>
             <a:fld id="{48A87A34-81AB-432B-8DAE-1953F412C126}" type="datetimeFigureOut">
               <a:rPr lang="en-US" dirty="0"/>
-              <a:t>11/4/2015</a:t>
+              <a:t>11/5/2015</a:t>
             </a:fld>
             <a:endParaRPr lang="en-US" dirty="0"/>
           </a:p>
@@ -4845,7 +4850,7 @@
           <a:p>
             <a:fld id="{48A87A34-81AB-432B-8DAE-1953F412C126}" type="datetimeFigureOut">
               <a:rPr lang="en-US" dirty="0"/>
-              <a:t>11/4/2015</a:t>
+              <a:t>11/5/2015</a:t>
             </a:fld>
             <a:endParaRPr lang="en-US" dirty="0"/>
           </a:p>
@@ -5103,7 +5108,7 @@
           <a:p>
             <a:fld id="{48A87A34-81AB-432B-8DAE-1953F412C126}" type="datetimeFigureOut">
               <a:rPr lang="en-US" dirty="0"/>
-              <a:t>11/4/2015</a:t>
+              <a:t>11/5/2015</a:t>
             </a:fld>
             <a:endParaRPr lang="en-US" dirty="0"/>
           </a:p>
@@ -5532,7 +5537,7 @@
           <a:p>
             <a:fld id="{48A87A34-81AB-432B-8DAE-1953F412C126}" type="datetimeFigureOut">
               <a:rPr lang="en-US" dirty="0"/>
-              <a:t>11/4/2015</a:t>
+              <a:t>11/5/2015</a:t>
             </a:fld>
             <a:endParaRPr lang="en-US" dirty="0"/>
           </a:p>
@@ -6073,7 +6078,7 @@
           <a:p>
             <a:fld id="{48A87A34-81AB-432B-8DAE-1953F412C126}" type="datetimeFigureOut">
               <a:rPr lang="en-US" dirty="0"/>
-              <a:t>11/4/2015</a:t>
+              <a:t>11/5/2015</a:t>
             </a:fld>
             <a:endParaRPr lang="en-US" dirty="0"/>
           </a:p>
@@ -6788,7 +6793,7 @@
           <a:p>
             <a:fld id="{48A87A34-81AB-432B-8DAE-1953F412C126}" type="datetimeFigureOut">
               <a:rPr lang="en-US" dirty="0"/>
-              <a:t>11/4/2015</a:t>
+              <a:t>11/5/2015</a:t>
             </a:fld>
             <a:endParaRPr lang="en-US" dirty="0"/>
           </a:p>
@@ -6953,7 +6958,7 @@
           <a:p>
             <a:fld id="{48A87A34-81AB-432B-8DAE-1953F412C126}" type="datetimeFigureOut">
               <a:rPr lang="en-US" dirty="0"/>
-              <a:t>11/4/2015</a:t>
+              <a:t>11/5/2015</a:t>
             </a:fld>
             <a:endParaRPr lang="en-US" dirty="0"/>
           </a:p>
@@ -7128,7 +7133,7 @@
           <a:p>
             <a:fld id="{48A87A34-81AB-432B-8DAE-1953F412C126}" type="datetimeFigureOut">
               <a:rPr lang="en-US" dirty="0"/>
-              <a:t>11/4/2015</a:t>
+              <a:t>11/5/2015</a:t>
             </a:fld>
             <a:endParaRPr lang="en-US" dirty="0"/>
           </a:p>
@@ -7293,7 +7298,7 @@
           <a:p>
             <a:fld id="{48A87A34-81AB-432B-8DAE-1953F412C126}" type="datetimeFigureOut">
               <a:rPr lang="en-US" dirty="0"/>
-              <a:t>11/4/2015</a:t>
+              <a:t>11/5/2015</a:t>
             </a:fld>
             <a:endParaRPr lang="en-US" dirty="0"/>
           </a:p>
@@ -7538,7 +7543,7 @@
           <a:p>
             <a:fld id="{48A87A34-81AB-432B-8DAE-1953F412C126}" type="datetimeFigureOut">
               <a:rPr lang="en-US" dirty="0"/>
-              <a:t>11/4/2015</a:t>
+              <a:t>11/5/2015</a:t>
             </a:fld>
             <a:endParaRPr lang="en-US" dirty="0"/>
           </a:p>
@@ -7765,7 +7770,7 @@
           <a:p>
             <a:fld id="{48A87A34-81AB-432B-8DAE-1953F412C126}" type="datetimeFigureOut">
               <a:rPr lang="en-US" dirty="0"/>
-              <a:t>11/4/2015</a:t>
+              <a:t>11/5/2015</a:t>
             </a:fld>
             <a:endParaRPr lang="en-US" dirty="0"/>
           </a:p>
@@ -8141,7 +8146,7 @@
           <a:p>
             <a:fld id="{48A87A34-81AB-432B-8DAE-1953F412C126}" type="datetimeFigureOut">
               <a:rPr lang="en-US" dirty="0"/>
-              <a:t>11/4/2015</a:t>
+              <a:t>11/5/2015</a:t>
             </a:fld>
             <a:endParaRPr lang="en-US" dirty="0"/>
           </a:p>
@@ -8254,7 +8259,7 @@
           <a:p>
             <a:fld id="{48A87A34-81AB-432B-8DAE-1953F412C126}" type="datetimeFigureOut">
               <a:rPr lang="en-US" dirty="0"/>
-              <a:t>11/4/2015</a:t>
+              <a:t>11/5/2015</a:t>
             </a:fld>
             <a:endParaRPr lang="en-US" dirty="0"/>
           </a:p>
@@ -8344,7 +8349,7 @@
           <a:p>
             <a:fld id="{48A87A34-81AB-432B-8DAE-1953F412C126}" type="datetimeFigureOut">
               <a:rPr lang="en-US" dirty="0"/>
-              <a:t>11/4/2015</a:t>
+              <a:t>11/5/2015</a:t>
             </a:fld>
             <a:endParaRPr lang="en-US" dirty="0"/>
           </a:p>
@@ -8588,7 +8593,7 @@
           <a:p>
             <a:fld id="{48A87A34-81AB-432B-8DAE-1953F412C126}" type="datetimeFigureOut">
               <a:rPr lang="en-US" dirty="0"/>
-              <a:t>11/4/2015</a:t>
+              <a:t>11/5/2015</a:t>
             </a:fld>
             <a:endParaRPr lang="en-US" dirty="0"/>
           </a:p>
@@ -8863,7 +8868,7 @@
           <a:p>
             <a:fld id="{48A87A34-81AB-432B-8DAE-1953F412C126}" type="datetimeFigureOut">
               <a:rPr lang="en-US" dirty="0"/>
-              <a:t>11/4/2015</a:t>
+              <a:t>11/5/2015</a:t>
             </a:fld>
             <a:endParaRPr lang="en-US" dirty="0"/>
           </a:p>
@@ -8981,7 +8986,7 @@
           <a:noFill/>
           <a:extLst>
             <a:ext uri="{909E8E84-426E-40dd-AFC4-6F175D3DCCD1}">
-              <a14:hiddenFill xmlns:a14="http://schemas.microsoft.com/office/drawing/2010/main" xmlns="">
+              <a14:hiddenFill xmlns="" xmlns:a14="http://schemas.microsoft.com/office/drawing/2010/main">
                 <a:solidFill>
                   <a:srgbClr val="FFFFFF"/>
                 </a:solidFill>
@@ -9055,7 +9060,7 @@
               </a:ln>
               <a:extLst>
                 <a:ext uri="{91240B29-F687-4f45-9708-019B960494DF}">
-                  <a14:hiddenLine xmlns:a14="http://schemas.microsoft.com/office/drawing/2010/main" xmlns="" w="9525">
+                  <a14:hiddenLine xmlns="" xmlns:a14="http://schemas.microsoft.com/office/drawing/2010/main" w="9525">
                     <a:solidFill>
                       <a:srgbClr val="000000"/>
                     </a:solidFill>
@@ -9145,7 +9150,7 @@
               </a:ln>
               <a:extLst>
                 <a:ext uri="{91240B29-F687-4f45-9708-019B960494DF}">
-                  <a14:hiddenLine xmlns:a14="http://schemas.microsoft.com/office/drawing/2010/main" xmlns="" w="9525">
+                  <a14:hiddenLine xmlns="" xmlns:a14="http://schemas.microsoft.com/office/drawing/2010/main" w="9525">
                     <a:solidFill>
                       <a:srgbClr val="000000"/>
                     </a:solidFill>
@@ -9235,7 +9240,7 @@
               </a:ln>
               <a:extLst>
                 <a:ext uri="{91240B29-F687-4f45-9708-019B960494DF}">
-                  <a14:hiddenLine xmlns:a14="http://schemas.microsoft.com/office/drawing/2010/main" xmlns="" w="9525">
+                  <a14:hiddenLine xmlns="" xmlns:a14="http://schemas.microsoft.com/office/drawing/2010/main" w="9525">
                     <a:solidFill>
                       <a:srgbClr val="000000"/>
                     </a:solidFill>
@@ -9297,7 +9302,7 @@
               </a:ln>
               <a:extLst>
                 <a:ext uri="{91240B29-F687-4f45-9708-019B960494DF}">
-                  <a14:hiddenLine xmlns:a14="http://schemas.microsoft.com/office/drawing/2010/main" xmlns="" w="9525">
+                  <a14:hiddenLine xmlns="" xmlns:a14="http://schemas.microsoft.com/office/drawing/2010/main" w="9525">
                     <a:solidFill>
                       <a:srgbClr val="000000"/>
                     </a:solidFill>
@@ -9387,7 +9392,7 @@
               </a:ln>
               <a:extLst>
                 <a:ext uri="{91240B29-F687-4f45-9708-019B960494DF}">
-                  <a14:hiddenLine xmlns:a14="http://schemas.microsoft.com/office/drawing/2010/main" xmlns="" w="9525">
+                  <a14:hiddenLine xmlns="" xmlns:a14="http://schemas.microsoft.com/office/drawing/2010/main" w="9525">
                     <a:solidFill>
                       <a:srgbClr val="000000"/>
                     </a:solidFill>
@@ -9449,7 +9454,7 @@
               </a:ln>
               <a:extLst>
                 <a:ext uri="{91240B29-F687-4f45-9708-019B960494DF}">
-                  <a14:hiddenLine xmlns:a14="http://schemas.microsoft.com/office/drawing/2010/main" xmlns="" w="9525">
+                  <a14:hiddenLine xmlns="" xmlns:a14="http://schemas.microsoft.com/office/drawing/2010/main" w="9525">
                     <a:solidFill>
                       <a:srgbClr val="000000"/>
                     </a:solidFill>
@@ -9511,7 +9516,7 @@
               </a:ln>
               <a:extLst>
                 <a:ext uri="{91240B29-F687-4f45-9708-019B960494DF}">
-                  <a14:hiddenLine xmlns:a14="http://schemas.microsoft.com/office/drawing/2010/main" xmlns="" w="9525">
+                  <a14:hiddenLine xmlns="" xmlns:a14="http://schemas.microsoft.com/office/drawing/2010/main" w="9525">
                     <a:solidFill>
                       <a:srgbClr val="000000"/>
                     </a:solidFill>
@@ -9601,7 +9606,7 @@
               </a:ln>
               <a:extLst>
                 <a:ext uri="{91240B29-F687-4f45-9708-019B960494DF}">
-                  <a14:hiddenLine xmlns:a14="http://schemas.microsoft.com/office/drawing/2010/main" xmlns="" w="9525">
+                  <a14:hiddenLine xmlns="" xmlns:a14="http://schemas.microsoft.com/office/drawing/2010/main" w="9525">
                     <a:solidFill>
                       <a:srgbClr val="000000"/>
                     </a:solidFill>
@@ -9691,7 +9696,7 @@
               </a:ln>
               <a:extLst>
                 <a:ext uri="{91240B29-F687-4f45-9708-019B960494DF}">
-                  <a14:hiddenLine xmlns:a14="http://schemas.microsoft.com/office/drawing/2010/main" xmlns="" w="9525">
+                  <a14:hiddenLine xmlns="" xmlns:a14="http://schemas.microsoft.com/office/drawing/2010/main" w="9525">
                     <a:solidFill>
                       <a:srgbClr val="000000"/>
                     </a:solidFill>
@@ -9753,7 +9758,7 @@
               </a:ln>
               <a:extLst>
                 <a:ext uri="{91240B29-F687-4f45-9708-019B960494DF}">
-                  <a14:hiddenLine xmlns:a14="http://schemas.microsoft.com/office/drawing/2010/main" xmlns="" w="9525">
+                  <a14:hiddenLine xmlns="" xmlns:a14="http://schemas.microsoft.com/office/drawing/2010/main" w="9525">
                     <a:solidFill>
                       <a:srgbClr val="000000"/>
                     </a:solidFill>
@@ -9863,7 +9868,7 @@
               </a:ln>
               <a:extLst>
                 <a:ext uri="{91240B29-F687-4f45-9708-019B960494DF}">
-                  <a14:hiddenLine xmlns:a14="http://schemas.microsoft.com/office/drawing/2010/main" xmlns="" w="9525">
+                  <a14:hiddenLine xmlns="" xmlns:a14="http://schemas.microsoft.com/office/drawing/2010/main" w="9525">
                     <a:solidFill>
                       <a:srgbClr val="000000"/>
                     </a:solidFill>
@@ -9947,7 +9952,7 @@
               </a:ln>
               <a:extLst>
                 <a:ext uri="{91240B29-F687-4f45-9708-019B960494DF}">
-                  <a14:hiddenLine xmlns:a14="http://schemas.microsoft.com/office/drawing/2010/main" xmlns="" w="9525">
+                  <a14:hiddenLine xmlns="" xmlns:a14="http://schemas.microsoft.com/office/drawing/2010/main" w="9525">
                     <a:solidFill>
                       <a:srgbClr val="000000"/>
                     </a:solidFill>
@@ -10009,7 +10014,7 @@
               </a:ln>
               <a:extLst>
                 <a:ext uri="{91240B29-F687-4f45-9708-019B960494DF}">
-                  <a14:hiddenLine xmlns:a14="http://schemas.microsoft.com/office/drawing/2010/main" xmlns="" w="9525">
+                  <a14:hiddenLine xmlns="" xmlns:a14="http://schemas.microsoft.com/office/drawing/2010/main" w="9525">
                     <a:solidFill>
                       <a:srgbClr val="000000"/>
                     </a:solidFill>
@@ -10071,7 +10076,7 @@
               </a:ln>
               <a:extLst>
                 <a:ext uri="{91240B29-F687-4f45-9708-019B960494DF}">
-                  <a14:hiddenLine xmlns:a14="http://schemas.microsoft.com/office/drawing/2010/main" xmlns="" w="9525">
+                  <a14:hiddenLine xmlns="" xmlns:a14="http://schemas.microsoft.com/office/drawing/2010/main" w="9525">
                     <a:solidFill>
                       <a:srgbClr val="000000"/>
                     </a:solidFill>
@@ -10161,7 +10166,7 @@
               </a:ln>
               <a:extLst>
                 <a:ext uri="{91240B29-F687-4f45-9708-019B960494DF}">
-                  <a14:hiddenLine xmlns:a14="http://schemas.microsoft.com/office/drawing/2010/main" xmlns="" w="9525">
+                  <a14:hiddenLine xmlns="" xmlns:a14="http://schemas.microsoft.com/office/drawing/2010/main" w="9525">
                     <a:solidFill>
                       <a:srgbClr val="000000"/>
                     </a:solidFill>
@@ -10195,7 +10200,7 @@
               </a:ln>
               <a:extLst>
                 <a:ext uri="{91240B29-F687-4f45-9708-019B960494DF}">
-                  <a14:hiddenLine xmlns:a14="http://schemas.microsoft.com/office/drawing/2010/main" xmlns="" w="9525">
+                  <a14:hiddenLine xmlns="" xmlns:a14="http://schemas.microsoft.com/office/drawing/2010/main" w="9525">
                     <a:solidFill>
                       <a:srgbClr val="000000"/>
                     </a:solidFill>
@@ -10260,7 +10265,7 @@
               </a:ln>
               <a:extLst>
                 <a:ext uri="{91240B29-F687-4f45-9708-019B960494DF}">
-                  <a14:hiddenLine xmlns:a14="http://schemas.microsoft.com/office/drawing/2010/main" xmlns="" w="9525">
+                  <a14:hiddenLine xmlns="" xmlns:a14="http://schemas.microsoft.com/office/drawing/2010/main" w="9525">
                     <a:solidFill>
                       <a:srgbClr val="000000"/>
                     </a:solidFill>
@@ -10350,7 +10355,7 @@
               </a:ln>
               <a:extLst>
                 <a:ext uri="{91240B29-F687-4f45-9708-019B960494DF}">
-                  <a14:hiddenLine xmlns:a14="http://schemas.microsoft.com/office/drawing/2010/main" xmlns="" w="9525">
+                  <a14:hiddenLine xmlns="" xmlns:a14="http://schemas.microsoft.com/office/drawing/2010/main" w="9525">
                     <a:solidFill>
                       <a:srgbClr val="000000"/>
                     </a:solidFill>
@@ -10412,7 +10417,7 @@
               </a:ln>
               <a:extLst>
                 <a:ext uri="{91240B29-F687-4f45-9708-019B960494DF}">
-                  <a14:hiddenLine xmlns:a14="http://schemas.microsoft.com/office/drawing/2010/main" xmlns="" w="9525">
+                  <a14:hiddenLine xmlns="" xmlns:a14="http://schemas.microsoft.com/office/drawing/2010/main" w="9525">
                     <a:solidFill>
                       <a:srgbClr val="000000"/>
                     </a:solidFill>
@@ -10502,7 +10507,7 @@
               </a:ln>
               <a:extLst>
                 <a:ext uri="{91240B29-F687-4f45-9708-019B960494DF}">
-                  <a14:hiddenLine xmlns:a14="http://schemas.microsoft.com/office/drawing/2010/main" xmlns="" w="9525">
+                  <a14:hiddenLine xmlns="" xmlns:a14="http://schemas.microsoft.com/office/drawing/2010/main" w="9525">
                     <a:solidFill>
                       <a:srgbClr val="000000"/>
                     </a:solidFill>
@@ -10567,7 +10572,7 @@
               </a:ln>
               <a:extLst>
                 <a:ext uri="{91240B29-F687-4f45-9708-019B960494DF}">
-                  <a14:hiddenLine xmlns:a14="http://schemas.microsoft.com/office/drawing/2010/main" xmlns="" w="9525">
+                  <a14:hiddenLine xmlns="" xmlns:a14="http://schemas.microsoft.com/office/drawing/2010/main" w="9525">
                     <a:solidFill>
                       <a:srgbClr val="000000"/>
                     </a:solidFill>
@@ -10629,7 +10634,7 @@
               </a:ln>
               <a:extLst>
                 <a:ext uri="{91240B29-F687-4f45-9708-019B960494DF}">
-                  <a14:hiddenLine xmlns:a14="http://schemas.microsoft.com/office/drawing/2010/main" xmlns="" w="9525">
+                  <a14:hiddenLine xmlns="" xmlns:a14="http://schemas.microsoft.com/office/drawing/2010/main" w="9525">
                     <a:solidFill>
                       <a:srgbClr val="000000"/>
                     </a:solidFill>
@@ -10719,7 +10724,7 @@
               </a:ln>
               <a:extLst>
                 <a:ext uri="{91240B29-F687-4f45-9708-019B960494DF}">
-                  <a14:hiddenLine xmlns:a14="http://schemas.microsoft.com/office/drawing/2010/main" xmlns="" w="9525">
+                  <a14:hiddenLine xmlns="" xmlns:a14="http://schemas.microsoft.com/office/drawing/2010/main" w="9525">
                     <a:solidFill>
                       <a:srgbClr val="000000"/>
                     </a:solidFill>
@@ -10809,7 +10814,7 @@
               </a:ln>
               <a:extLst>
                 <a:ext uri="{91240B29-F687-4f45-9708-019B960494DF}">
-                  <a14:hiddenLine xmlns:a14="http://schemas.microsoft.com/office/drawing/2010/main" xmlns="" w="9525">
+                  <a14:hiddenLine xmlns="" xmlns:a14="http://schemas.microsoft.com/office/drawing/2010/main" w="9525">
                     <a:solidFill>
                       <a:srgbClr val="000000"/>
                     </a:solidFill>
@@ -10874,7 +10879,7 @@
               </a:ln>
               <a:extLst>
                 <a:ext uri="{91240B29-F687-4f45-9708-019B960494DF}">
-                  <a14:hiddenLine xmlns:a14="http://schemas.microsoft.com/office/drawing/2010/main" xmlns="" w="9525">
+                  <a14:hiddenLine xmlns="" xmlns:a14="http://schemas.microsoft.com/office/drawing/2010/main" w="9525">
                     <a:solidFill>
                       <a:srgbClr val="000000"/>
                     </a:solidFill>
@@ -10994,7 +10999,7 @@
               </a:ln>
               <a:extLst>
                 <a:ext uri="{91240B29-F687-4f45-9708-019B960494DF}">
-                  <a14:hiddenLine xmlns:a14="http://schemas.microsoft.com/office/drawing/2010/main" xmlns="" w="9525">
+                  <a14:hiddenLine xmlns="" xmlns:a14="http://schemas.microsoft.com/office/drawing/2010/main" w="9525">
                     <a:solidFill>
                       <a:srgbClr val="000000"/>
                     </a:solidFill>
@@ -11075,7 +11080,7 @@
               </a:ln>
               <a:extLst>
                 <a:ext uri="{91240B29-F687-4f45-9708-019B960494DF}">
-                  <a14:hiddenLine xmlns:a14="http://schemas.microsoft.com/office/drawing/2010/main" xmlns="" w="9525">
+                  <a14:hiddenLine xmlns="" xmlns:a14="http://schemas.microsoft.com/office/drawing/2010/main" w="9525">
                     <a:solidFill>
                       <a:srgbClr val="000000"/>
                     </a:solidFill>
@@ -11190,7 +11195,7 @@
               </a:ln>
               <a:extLst>
                 <a:ext uri="{91240B29-F687-4f45-9708-019B960494DF}">
-                  <a14:hiddenLine xmlns:a14="http://schemas.microsoft.com/office/drawing/2010/main" xmlns="" w="9525">
+                  <a14:hiddenLine xmlns="" xmlns:a14="http://schemas.microsoft.com/office/drawing/2010/main" w="9525">
                     <a:solidFill>
                       <a:srgbClr val="000000"/>
                     </a:solidFill>
@@ -11280,7 +11285,7 @@
               </a:ln>
               <a:extLst>
                 <a:ext uri="{91240B29-F687-4f45-9708-019B960494DF}">
-                  <a14:hiddenLine xmlns:a14="http://schemas.microsoft.com/office/drawing/2010/main" xmlns="" w="9525">
+                  <a14:hiddenLine xmlns="" xmlns:a14="http://schemas.microsoft.com/office/drawing/2010/main" w="9525">
                     <a:solidFill>
                       <a:srgbClr val="000000"/>
                     </a:solidFill>
@@ -11345,7 +11350,7 @@
               </a:ln>
               <a:extLst>
                 <a:ext uri="{91240B29-F687-4f45-9708-019B960494DF}">
-                  <a14:hiddenLine xmlns:a14="http://schemas.microsoft.com/office/drawing/2010/main" xmlns="" w="9525">
+                  <a14:hiddenLine xmlns="" xmlns:a14="http://schemas.microsoft.com/office/drawing/2010/main" w="9525">
                     <a:solidFill>
                       <a:srgbClr val="000000"/>
                     </a:solidFill>
@@ -11435,7 +11440,7 @@
               </a:ln>
               <a:extLst>
                 <a:ext uri="{91240B29-F687-4f45-9708-019B960494DF}">
-                  <a14:hiddenLine xmlns:a14="http://schemas.microsoft.com/office/drawing/2010/main" xmlns="" w="9525">
+                  <a14:hiddenLine xmlns="" xmlns:a14="http://schemas.microsoft.com/office/drawing/2010/main" w="9525">
                     <a:solidFill>
                       <a:srgbClr val="000000"/>
                     </a:solidFill>
@@ -11503,7 +11508,7 @@
               </a:ln>
               <a:extLst>
                 <a:ext uri="{91240B29-F687-4f45-9708-019B960494DF}">
-                  <a14:hiddenLine xmlns:a14="http://schemas.microsoft.com/office/drawing/2010/main" xmlns="" w="9525">
+                  <a14:hiddenLine xmlns="" xmlns:a14="http://schemas.microsoft.com/office/drawing/2010/main" w="9525">
                     <a:solidFill>
                       <a:srgbClr val="000000"/>
                     </a:solidFill>
@@ -11593,7 +11598,7 @@
               </a:ln>
               <a:extLst>
                 <a:ext uri="{91240B29-F687-4f45-9708-019B960494DF}">
-                  <a14:hiddenLine xmlns:a14="http://schemas.microsoft.com/office/drawing/2010/main" xmlns="" w="9525">
+                  <a14:hiddenLine xmlns="" xmlns:a14="http://schemas.microsoft.com/office/drawing/2010/main" w="9525">
                     <a:solidFill>
                       <a:srgbClr val="000000"/>
                     </a:solidFill>
@@ -11661,7 +11666,7 @@
               </a:ln>
               <a:extLst>
                 <a:ext uri="{91240B29-F687-4f45-9708-019B960494DF}">
-                  <a14:hiddenLine xmlns:a14="http://schemas.microsoft.com/office/drawing/2010/main" xmlns="" w="9525">
+                  <a14:hiddenLine xmlns="" xmlns:a14="http://schemas.microsoft.com/office/drawing/2010/main" w="9525">
                     <a:solidFill>
                       <a:srgbClr val="000000"/>
                     </a:solidFill>
@@ -11751,7 +11756,7 @@
               </a:ln>
               <a:extLst>
                 <a:ext uri="{91240B29-F687-4f45-9708-019B960494DF}">
-                  <a14:hiddenLine xmlns:a14="http://schemas.microsoft.com/office/drawing/2010/main" xmlns="" w="9525">
+                  <a14:hiddenLine xmlns="" xmlns:a14="http://schemas.microsoft.com/office/drawing/2010/main" w="9525">
                     <a:solidFill>
                       <a:srgbClr val="000000"/>
                     </a:solidFill>
@@ -11785,7 +11790,7 @@
               </a:ln>
               <a:extLst>
                 <a:ext uri="{91240B29-F687-4f45-9708-019B960494DF}">
-                  <a14:hiddenLine xmlns:a14="http://schemas.microsoft.com/office/drawing/2010/main" xmlns="" w="9525">
+                  <a14:hiddenLine xmlns="" xmlns:a14="http://schemas.microsoft.com/office/drawing/2010/main" w="9525">
                     <a:solidFill>
                       <a:srgbClr val="000000"/>
                     </a:solidFill>
@@ -11926,7 +11931,7 @@
             <a:fld id="{48A87A34-81AB-432B-8DAE-1953F412C126}" type="datetimeFigureOut">
               <a:rPr lang="en-US" dirty="0"/>
               <a:pPr/>
-              <a:t>11/4/2015</a:t>
+              <a:t>11/5/2015</a:t>
             </a:fld>
             <a:endParaRPr lang="en-US" dirty="0"/>
           </a:p>
@@ -12658,57 +12663,32 @@
           </a:p>
         </p:txBody>
       </p:sp>
-      <p:sp>
-        <p:nvSpPr>
-          <p:cNvPr id="3" name="Content Placeholder 2"/>
-          <p:cNvSpPr>
-            <a:spLocks noGrp="1"/>
-          </p:cNvSpPr>
+      <p:pic>
+        <p:nvPicPr>
+          <p:cNvPr id="4" name="Content Placeholder 3"/>
+          <p:cNvPicPr>
+            <a:picLocks noGrp="1" noChangeAspect="1"/>
+          </p:cNvPicPr>
           <p:nvPr>
             <p:ph idx="1"/>
           </p:nvPr>
-        </p:nvSpPr>
-        <p:spPr/>
-        <p:txBody>
-          <a:bodyPr/>
-          <a:lstStyle/>
-          <a:p>
-            <a:r>
-              <a:rPr lang="en-US" dirty="0" smtClean="0"/>
-              <a:t>// </a:t>
-            </a:r>
-            <a:r>
-              <a:rPr lang="en-US" dirty="0" err="1" smtClean="0"/>
-              <a:t>ook</a:t>
-            </a:r>
-            <a:r>
-              <a:rPr lang="en-US" dirty="0" smtClean="0"/>
-              <a:t> </a:t>
-            </a:r>
-            <a:r>
-              <a:rPr lang="en-US" dirty="0" err="1" smtClean="0"/>
-              <a:t>ff</a:t>
-            </a:r>
-            <a:r>
-              <a:rPr lang="en-US" dirty="0" smtClean="0"/>
-              <a:t> screenshot van de game </a:t>
-            </a:r>
-            <a:r>
-              <a:rPr lang="en-US" dirty="0" err="1" smtClean="0"/>
-              <a:t>hier</a:t>
-            </a:r>
-            <a:r>
-              <a:rPr lang="en-US" dirty="0" smtClean="0"/>
-              <a:t> </a:t>
-            </a:r>
-            <a:r>
-              <a:rPr lang="en-US" dirty="0" err="1" smtClean="0"/>
-              <a:t>droppen</a:t>
-            </a:r>
-            <a:endParaRPr lang="en-US" dirty="0"/>
-          </a:p>
-        </p:txBody>
-      </p:sp>
+        </p:nvPicPr>
+        <p:blipFill>
+          <a:blip r:embed="rId2"/>
+          <a:stretch>
+            <a:fillRect/>
+          </a:stretch>
+        </p:blipFill>
+        <p:spPr>
+          <a:xfrm>
+            <a:off x="2559129" y="2249488"/>
+            <a:ext cx="7070568" cy="3541712"/>
+          </a:xfrm>
+          <a:prstGeom prst="rect">
+            <a:avLst/>
+          </a:prstGeom>
+        </p:spPr>
+      </p:pic>
     </p:spTree>
     <p:extLst>
       <p:ext uri="{BB962C8B-B14F-4D97-AF65-F5344CB8AC3E}">

</xml_diff>